<commit_message>
Adding information on first model
</commit_message>
<xml_diff>
--- a/ABM/01 Doors/Two Doors Design.pptx
+++ b/ABM/01 Doors/Two Doors Design.pptx
@@ -7,7 +7,8 @@
   <p:sldIdLst>
     <p:sldId id="263" r:id="rId2"/>
     <p:sldId id="264" r:id="rId3"/>
-    <p:sldId id="265" r:id="rId4"/>
+    <p:sldId id="266" r:id="rId4"/>
+    <p:sldId id="265" r:id="rId5"/>
   </p:sldIdLst>
   <p:sldSz cx="6858000" cy="9906000" type="A4"/>
   <p:notesSz cx="6858000" cy="9144000"/>
@@ -245,7 +246,7 @@
           <a:p>
             <a:fld id="{B17EA579-2D0F-B44A-BE19-84129DF81234}" type="datetimeFigureOut">
               <a:rPr lang="en-US" smtClean="0"/>
-              <a:t>11/20/24</a:t>
+              <a:t>11/22/24</a:t>
             </a:fld>
             <a:endParaRPr lang="en-US"/>
           </a:p>
@@ -415,7 +416,7 @@
           <a:p>
             <a:fld id="{B17EA579-2D0F-B44A-BE19-84129DF81234}" type="datetimeFigureOut">
               <a:rPr lang="en-US" smtClean="0"/>
-              <a:t>11/20/24</a:t>
+              <a:t>11/22/24</a:t>
             </a:fld>
             <a:endParaRPr lang="en-US"/>
           </a:p>
@@ -595,7 +596,7 @@
           <a:p>
             <a:fld id="{B17EA579-2D0F-B44A-BE19-84129DF81234}" type="datetimeFigureOut">
               <a:rPr lang="en-US" smtClean="0"/>
-              <a:t>11/20/24</a:t>
+              <a:t>11/22/24</a:t>
             </a:fld>
             <a:endParaRPr lang="en-US"/>
           </a:p>
@@ -765,7 +766,7 @@
           <a:p>
             <a:fld id="{B17EA579-2D0F-B44A-BE19-84129DF81234}" type="datetimeFigureOut">
               <a:rPr lang="en-US" smtClean="0"/>
-              <a:t>11/20/24</a:t>
+              <a:t>11/22/24</a:t>
             </a:fld>
             <a:endParaRPr lang="en-US"/>
           </a:p>
@@ -1009,7 +1010,7 @@
           <a:p>
             <a:fld id="{B17EA579-2D0F-B44A-BE19-84129DF81234}" type="datetimeFigureOut">
               <a:rPr lang="en-US" smtClean="0"/>
-              <a:t>11/20/24</a:t>
+              <a:t>11/22/24</a:t>
             </a:fld>
             <a:endParaRPr lang="en-US"/>
           </a:p>
@@ -1241,7 +1242,7 @@
           <a:p>
             <a:fld id="{B17EA579-2D0F-B44A-BE19-84129DF81234}" type="datetimeFigureOut">
               <a:rPr lang="en-US" smtClean="0"/>
-              <a:t>11/20/24</a:t>
+              <a:t>11/22/24</a:t>
             </a:fld>
             <a:endParaRPr lang="en-US"/>
           </a:p>
@@ -1608,7 +1609,7 @@
           <a:p>
             <a:fld id="{B17EA579-2D0F-B44A-BE19-84129DF81234}" type="datetimeFigureOut">
               <a:rPr lang="en-US" smtClean="0"/>
-              <a:t>11/20/24</a:t>
+              <a:t>11/22/24</a:t>
             </a:fld>
             <a:endParaRPr lang="en-US"/>
           </a:p>
@@ -1726,7 +1727,7 @@
           <a:p>
             <a:fld id="{B17EA579-2D0F-B44A-BE19-84129DF81234}" type="datetimeFigureOut">
               <a:rPr lang="en-US" smtClean="0"/>
-              <a:t>11/20/24</a:t>
+              <a:t>11/22/24</a:t>
             </a:fld>
             <a:endParaRPr lang="en-US"/>
           </a:p>
@@ -1821,7 +1822,7 @@
           <a:p>
             <a:fld id="{B17EA579-2D0F-B44A-BE19-84129DF81234}" type="datetimeFigureOut">
               <a:rPr lang="en-US" smtClean="0"/>
-              <a:t>11/20/24</a:t>
+              <a:t>11/22/24</a:t>
             </a:fld>
             <a:endParaRPr lang="en-US"/>
           </a:p>
@@ -2098,7 +2099,7 @@
           <a:p>
             <a:fld id="{B17EA579-2D0F-B44A-BE19-84129DF81234}" type="datetimeFigureOut">
               <a:rPr lang="en-US" smtClean="0"/>
-              <a:t>11/20/24</a:t>
+              <a:t>11/22/24</a:t>
             </a:fld>
             <a:endParaRPr lang="en-US"/>
           </a:p>
@@ -2355,7 +2356,7 @@
           <a:p>
             <a:fld id="{B17EA579-2D0F-B44A-BE19-84129DF81234}" type="datetimeFigureOut">
               <a:rPr lang="en-US" smtClean="0"/>
-              <a:t>11/20/24</a:t>
+              <a:t>11/22/24</a:t>
             </a:fld>
             <a:endParaRPr lang="en-US"/>
           </a:p>
@@ -2568,7 +2569,7 @@
           <a:p>
             <a:fld id="{B17EA579-2D0F-B44A-BE19-84129DF81234}" type="datetimeFigureOut">
               <a:rPr lang="en-US" smtClean="0"/>
-              <a:t>11/20/24</a:t>
+              <a:t>11/22/24</a:t>
             </a:fld>
             <a:endParaRPr lang="en-US"/>
           </a:p>
@@ -5031,6 +5032,66 @@
   <p:cSld>
     <p:spTree>
       <p:nvGrpSpPr>
+        <p:cNvPr id="1" name=""/>
+        <p:cNvGrpSpPr/>
+        <p:nvPr/>
+      </p:nvGrpSpPr>
+      <p:grpSpPr>
+        <a:xfrm>
+          <a:off x="0" y="0"/>
+          <a:ext cx="0" cy="0"/>
+          <a:chOff x="0" y="0"/>
+          <a:chExt cx="0" cy="0"/>
+        </a:xfrm>
+      </p:grpSpPr>
+      <p:pic>
+        <p:nvPicPr>
+          <p:cNvPr id="2" name="Picture 1" descr="A screenshot of a computer&#10;&#10;Description automatically generated">
+            <a:extLst>
+              <a:ext uri="{FF2B5EF4-FFF2-40B4-BE49-F238E27FC236}">
+                <a16:creationId xmlns:a16="http://schemas.microsoft.com/office/drawing/2014/main" id="{D2519D20-7B05-AAFA-6BA4-93E748BCF073}"/>
+              </a:ext>
+            </a:extLst>
+          </p:cNvPr>
+          <p:cNvPicPr>
+            <a:picLocks noChangeAspect="1"/>
+          </p:cNvPicPr>
+          <p:nvPr/>
+        </p:nvPicPr>
+        <p:blipFill>
+          <a:blip r:embed="rId2"/>
+          <a:stretch>
+            <a:fillRect/>
+          </a:stretch>
+        </p:blipFill>
+        <p:spPr>
+          <a:xfrm>
+            <a:off x="0" y="1733925"/>
+            <a:ext cx="6858000" cy="2856749"/>
+          </a:xfrm>
+          <a:prstGeom prst="rect">
+            <a:avLst/>
+          </a:prstGeom>
+        </p:spPr>
+      </p:pic>
+    </p:spTree>
+    <p:extLst>
+      <p:ext uri="{BB962C8B-B14F-4D97-AF65-F5344CB8AC3E}">
+        <p14:creationId xmlns:p14="http://schemas.microsoft.com/office/powerpoint/2010/main" val="1032732804"/>
+      </p:ext>
+    </p:extLst>
+  </p:cSld>
+  <p:clrMapOvr>
+    <a:masterClrMapping/>
+  </p:clrMapOvr>
+</p:sld>
+</file>
+
+<file path=ppt/slides/slide4.xml><?xml version="1.0" encoding="utf-8"?>
+<p:sld xmlns:a="http://schemas.openxmlformats.org/drawingml/2006/main" xmlns:r="http://schemas.openxmlformats.org/officeDocument/2006/relationships" xmlns:p="http://schemas.openxmlformats.org/presentationml/2006/main">
+  <p:cSld>
+    <p:spTree>
+      <p:nvGrpSpPr>
         <p:cNvPr id="1" name="">
           <a:extLst>
             <a:ext uri="{FF2B5EF4-FFF2-40B4-BE49-F238E27FC236}">

</xml_diff>

<commit_message>
Adding third example for NetLogo door colour diffusion model
</commit_message>
<xml_diff>
--- a/ABM/01 Doors/Two Doors Design.pptx
+++ b/ABM/01 Doors/Two Doors Design.pptx
@@ -7,8 +7,10 @@
   <p:sldIdLst>
     <p:sldId id="263" r:id="rId2"/>
     <p:sldId id="264" r:id="rId3"/>
-    <p:sldId id="266" r:id="rId4"/>
-    <p:sldId id="265" r:id="rId5"/>
+    <p:sldId id="267" r:id="rId4"/>
+    <p:sldId id="266" r:id="rId5"/>
+    <p:sldId id="265" r:id="rId6"/>
+    <p:sldId id="268" r:id="rId7"/>
   </p:sldIdLst>
   <p:sldSz cx="6858000" cy="9906000" type="A4"/>
   <p:notesSz cx="6858000" cy="9144000"/>
@@ -5049,6 +5051,66 @@
           <p:cNvPr id="2" name="Picture 1" descr="A screenshot of a computer&#10;&#10;Description automatically generated">
             <a:extLst>
               <a:ext uri="{FF2B5EF4-FFF2-40B4-BE49-F238E27FC236}">
+                <a16:creationId xmlns:a16="http://schemas.microsoft.com/office/drawing/2014/main" id="{42C156AB-A7EB-E2CE-2B90-F31F57E1C3CA}"/>
+              </a:ext>
+            </a:extLst>
+          </p:cNvPr>
+          <p:cNvPicPr>
+            <a:picLocks noChangeAspect="1"/>
+          </p:cNvPicPr>
+          <p:nvPr/>
+        </p:nvPicPr>
+        <p:blipFill>
+          <a:blip r:embed="rId2"/>
+          <a:stretch>
+            <a:fillRect/>
+          </a:stretch>
+        </p:blipFill>
+        <p:spPr>
+          <a:xfrm>
+            <a:off x="0" y="2643372"/>
+            <a:ext cx="6858000" cy="4619256"/>
+          </a:xfrm>
+          <a:prstGeom prst="rect">
+            <a:avLst/>
+          </a:prstGeom>
+        </p:spPr>
+      </p:pic>
+    </p:spTree>
+    <p:extLst>
+      <p:ext uri="{BB962C8B-B14F-4D97-AF65-F5344CB8AC3E}">
+        <p14:creationId xmlns:p14="http://schemas.microsoft.com/office/powerpoint/2010/main" val="3665079269"/>
+      </p:ext>
+    </p:extLst>
+  </p:cSld>
+  <p:clrMapOvr>
+    <a:masterClrMapping/>
+  </p:clrMapOvr>
+</p:sld>
+</file>
+
+<file path=ppt/slides/slide4.xml><?xml version="1.0" encoding="utf-8"?>
+<p:sld xmlns:a="http://schemas.openxmlformats.org/drawingml/2006/main" xmlns:r="http://schemas.openxmlformats.org/officeDocument/2006/relationships" xmlns:p="http://schemas.openxmlformats.org/presentationml/2006/main">
+  <p:cSld>
+    <p:spTree>
+      <p:nvGrpSpPr>
+        <p:cNvPr id="1" name=""/>
+        <p:cNvGrpSpPr/>
+        <p:nvPr/>
+      </p:nvGrpSpPr>
+      <p:grpSpPr>
+        <a:xfrm>
+          <a:off x="0" y="0"/>
+          <a:ext cx="0" cy="0"/>
+          <a:chOff x="0" y="0"/>
+          <a:chExt cx="0" cy="0"/>
+        </a:xfrm>
+      </p:grpSpPr>
+      <p:pic>
+        <p:nvPicPr>
+          <p:cNvPr id="2" name="Picture 1" descr="A screenshot of a computer&#10;&#10;Description automatically generated">
+            <a:extLst>
+              <a:ext uri="{FF2B5EF4-FFF2-40B4-BE49-F238E27FC236}">
                 <a16:creationId xmlns:a16="http://schemas.microsoft.com/office/drawing/2014/main" id="{D2519D20-7B05-AAFA-6BA4-93E748BCF073}"/>
               </a:ext>
             </a:extLst>
@@ -5074,6 +5136,36 @@
           </a:prstGeom>
         </p:spPr>
       </p:pic>
+      <p:pic>
+        <p:nvPicPr>
+          <p:cNvPr id="4" name="Picture 3" descr="A screenshot of a computer&#10;&#10;Description automatically generated">
+            <a:extLst>
+              <a:ext uri="{FF2B5EF4-FFF2-40B4-BE49-F238E27FC236}">
+                <a16:creationId xmlns:a16="http://schemas.microsoft.com/office/drawing/2014/main" id="{1308366D-2FBA-699E-F981-BDA3E883A6DE}"/>
+              </a:ext>
+            </a:extLst>
+          </p:cNvPr>
+          <p:cNvPicPr>
+            <a:picLocks noChangeAspect="1"/>
+          </p:cNvPicPr>
+          <p:nvPr/>
+        </p:nvPicPr>
+        <p:blipFill>
+          <a:blip r:embed="rId3"/>
+          <a:stretch>
+            <a:fillRect/>
+          </a:stretch>
+        </p:blipFill>
+        <p:spPr>
+          <a:xfrm>
+            <a:off x="0" y="5014156"/>
+            <a:ext cx="6858000" cy="4449623"/>
+          </a:xfrm>
+          <a:prstGeom prst="rect">
+            <a:avLst/>
+          </a:prstGeom>
+        </p:spPr>
+      </p:pic>
     </p:spTree>
     <p:extLst>
       <p:ext uri="{BB962C8B-B14F-4D97-AF65-F5344CB8AC3E}">
@@ -5087,7 +5179,7 @@
 </p:sld>
 </file>
 
-<file path=ppt/slides/slide4.xml><?xml version="1.0" encoding="utf-8"?>
+<file path=ppt/slides/slide5.xml><?xml version="1.0" encoding="utf-8"?>
 <p:sld xmlns:a="http://schemas.openxmlformats.org/drawingml/2006/main" xmlns:r="http://schemas.openxmlformats.org/officeDocument/2006/relationships" xmlns:p="http://schemas.openxmlformats.org/presentationml/2006/main">
   <p:cSld>
     <p:spTree>
@@ -6222,6 +6314,96 @@
     <p:extLst>
       <p:ext uri="{BB962C8B-B14F-4D97-AF65-F5344CB8AC3E}">
         <p14:creationId xmlns:p14="http://schemas.microsoft.com/office/powerpoint/2010/main" val="2525227307"/>
+      </p:ext>
+    </p:extLst>
+  </p:cSld>
+  <p:clrMapOvr>
+    <a:masterClrMapping/>
+  </p:clrMapOvr>
+</p:sld>
+</file>
+
+<file path=ppt/slides/slide6.xml><?xml version="1.0" encoding="utf-8"?>
+<p:sld xmlns:a="http://schemas.openxmlformats.org/drawingml/2006/main" xmlns:r="http://schemas.openxmlformats.org/officeDocument/2006/relationships" xmlns:p="http://schemas.openxmlformats.org/presentationml/2006/main">
+  <p:cSld>
+    <p:spTree>
+      <p:nvGrpSpPr>
+        <p:cNvPr id="1" name=""/>
+        <p:cNvGrpSpPr/>
+        <p:nvPr/>
+      </p:nvGrpSpPr>
+      <p:grpSpPr>
+        <a:xfrm>
+          <a:off x="0" y="0"/>
+          <a:ext cx="0" cy="0"/>
+          <a:chOff x="0" y="0"/>
+          <a:chExt cx="0" cy="0"/>
+        </a:xfrm>
+      </p:grpSpPr>
+      <p:pic>
+        <p:nvPicPr>
+          <p:cNvPr id="3" name="Picture 2">
+            <a:extLst>
+              <a:ext uri="{FF2B5EF4-FFF2-40B4-BE49-F238E27FC236}">
+                <a16:creationId xmlns:a16="http://schemas.microsoft.com/office/drawing/2014/main" id="{42F06E79-F7DD-C5E9-05CA-A64B484B77A4}"/>
+              </a:ext>
+            </a:extLst>
+          </p:cNvPr>
+          <p:cNvPicPr>
+            <a:picLocks noChangeAspect="1"/>
+          </p:cNvPicPr>
+          <p:nvPr/>
+        </p:nvPicPr>
+        <p:blipFill>
+          <a:blip r:embed="rId2"/>
+          <a:stretch>
+            <a:fillRect/>
+          </a:stretch>
+        </p:blipFill>
+        <p:spPr>
+          <a:xfrm>
+            <a:off x="101600" y="1625600"/>
+            <a:ext cx="6654800" cy="6654800"/>
+          </a:xfrm>
+          <a:prstGeom prst="rect">
+            <a:avLst/>
+          </a:prstGeom>
+        </p:spPr>
+      </p:pic>
+      <p:pic>
+        <p:nvPicPr>
+          <p:cNvPr id="5" name="Picture 4">
+            <a:extLst>
+              <a:ext uri="{FF2B5EF4-FFF2-40B4-BE49-F238E27FC236}">
+                <a16:creationId xmlns:a16="http://schemas.microsoft.com/office/drawing/2014/main" id="{46069366-C38B-1FF7-6B7B-E7005F5518E2}"/>
+              </a:ext>
+            </a:extLst>
+          </p:cNvPr>
+          <p:cNvPicPr>
+            <a:picLocks noChangeAspect="1"/>
+          </p:cNvPicPr>
+          <p:nvPr/>
+        </p:nvPicPr>
+        <p:blipFill>
+          <a:blip r:embed="rId3"/>
+          <a:stretch>
+            <a:fillRect/>
+          </a:stretch>
+        </p:blipFill>
+        <p:spPr>
+          <a:xfrm>
+            <a:off x="400957" y="762000"/>
+            <a:ext cx="5765800" cy="863600"/>
+          </a:xfrm>
+          <a:prstGeom prst="rect">
+            <a:avLst/>
+          </a:prstGeom>
+        </p:spPr>
+      </p:pic>
+    </p:spTree>
+    <p:extLst>
+      <p:ext uri="{BB962C8B-B14F-4D97-AF65-F5344CB8AC3E}">
+        <p14:creationId xmlns:p14="http://schemas.microsoft.com/office/powerpoint/2010/main" val="3248099279"/>
       </p:ext>
     </p:extLst>
   </p:cSld>

</xml_diff>